<commit_message>
New practice was added to session3
</commit_message>
<xml_diff>
--- a/session3/TDD Foundations.pptx
+++ b/session3/TDD Foundations.pptx
@@ -15,19 +15,8 @@
     <p:sldId id="263" r:id="rId9"/>
     <p:sldId id="264" r:id="rId10"/>
     <p:sldId id="265" r:id="rId11"/>
-    <p:sldId id="267" r:id="rId12"/>
-    <p:sldId id="268" r:id="rId13"/>
-    <p:sldId id="269" r:id="rId14"/>
-    <p:sldId id="270" r:id="rId15"/>
-    <p:sldId id="271" r:id="rId16"/>
-    <p:sldId id="272" r:id="rId17"/>
-    <p:sldId id="273" r:id="rId18"/>
-    <p:sldId id="274" r:id="rId19"/>
-    <p:sldId id="275" r:id="rId20"/>
-    <p:sldId id="276" r:id="rId21"/>
-    <p:sldId id="277" r:id="rId22"/>
-    <p:sldId id="278" r:id="rId23"/>
-    <p:sldId id="279" r:id="rId24"/>
+    <p:sldId id="278" r:id="rId12"/>
+    <p:sldId id="279" r:id="rId13"/>
   </p:sldIdLst>
   <p:sldSz cx="12192000" cy="6858000"/>
   <p:notesSz cx="6858000" cy="9144000"/>
@@ -360,7 +349,7 @@
           <a:p>
             <a:fld id="{96DFF08F-DC6B-4601-B491-B0F83F6DD2DA}" type="datetimeFigureOut">
               <a:rPr lang="en-US" dirty="0"/>
-              <a:t>4/8/2019</a:t>
+              <a:t>4/9/2019</a:t>
             </a:fld>
             <a:endParaRPr lang="en-US" dirty="0"/>
           </a:p>
@@ -563,7 +552,7 @@
           <a:p>
             <a:fld id="{96DFF08F-DC6B-4601-B491-B0F83F6DD2DA}" type="datetimeFigureOut">
               <a:rPr lang="en-US" dirty="0"/>
-              <a:t>4/8/2019</a:t>
+              <a:t>4/9/2019</a:t>
             </a:fld>
             <a:endParaRPr lang="en-US" dirty="0"/>
           </a:p>
@@ -814,7 +803,7 @@
           <a:p>
             <a:fld id="{96DFF08F-DC6B-4601-B491-B0F83F6DD2DA}" type="datetimeFigureOut">
               <a:rPr lang="en-US" dirty="0"/>
-              <a:t>4/8/2019</a:t>
+              <a:t>4/9/2019</a:t>
             </a:fld>
             <a:endParaRPr lang="en-US" dirty="0"/>
           </a:p>
@@ -979,7 +968,7 @@
           <a:p>
             <a:fld id="{D62CEF3B-A037-46D0-B02C-1428F07E9383}" type="datetimeFigureOut">
               <a:rPr lang="en-US" dirty="0"/>
-              <a:t>4/8/2019</a:t>
+              <a:t>4/9/2019</a:t>
             </a:fld>
             <a:endParaRPr lang="en-US" dirty="0"/>
           </a:p>
@@ -1317,7 +1306,7 @@
           <a:p>
             <a:fld id="{96DFF08F-DC6B-4601-B491-B0F83F6DD2DA}" type="datetimeFigureOut">
               <a:rPr lang="en-US" dirty="0"/>
-              <a:t>4/8/2019</a:t>
+              <a:t>4/9/2019</a:t>
             </a:fld>
             <a:endParaRPr lang="en-US" dirty="0"/>
           </a:p>
@@ -1587,7 +1576,7 @@
           <a:p>
             <a:fld id="{96DFF08F-DC6B-4601-B491-B0F83F6DD2DA}" type="datetimeFigureOut">
               <a:rPr lang="en-US" dirty="0"/>
-              <a:t>4/8/2019</a:t>
+              <a:t>4/9/2019</a:t>
             </a:fld>
             <a:endParaRPr lang="en-US" dirty="0"/>
           </a:p>
@@ -1961,7 +1950,7 @@
           <a:p>
             <a:fld id="{96DFF08F-DC6B-4601-B491-B0F83F6DD2DA}" type="datetimeFigureOut">
               <a:rPr lang="en-US" dirty="0"/>
-              <a:t>4/8/2019</a:t>
+              <a:t>4/9/2019</a:t>
             </a:fld>
             <a:endParaRPr lang="en-US" dirty="0"/>
           </a:p>
@@ -2074,7 +2063,7 @@
           <a:p>
             <a:fld id="{96DFF08F-DC6B-4601-B491-B0F83F6DD2DA}" type="datetimeFigureOut">
               <a:rPr lang="en-US" dirty="0"/>
-              <a:t>4/8/2019</a:t>
+              <a:t>4/9/2019</a:t>
             </a:fld>
             <a:endParaRPr lang="en-US" dirty="0"/>
           </a:p>
@@ -2241,7 +2230,7 @@
             <a:fld id="{96DFF08F-DC6B-4601-B491-B0F83F6DD2DA}" type="datetimeFigureOut">
               <a:rPr lang="en-US" dirty="0"/>
               <a:pPr/>
-              <a:t>4/8/2019</a:t>
+              <a:t>4/9/2019</a:t>
             </a:fld>
             <a:endParaRPr lang="en-US" dirty="0"/>
           </a:p>
@@ -2592,7 +2581,7 @@
             <a:fld id="{96DFF08F-DC6B-4601-B491-B0F83F6DD2DA}" type="datetimeFigureOut">
               <a:rPr lang="en-US" dirty="0"/>
               <a:pPr/>
-              <a:t>4/8/2019</a:t>
+              <a:t>4/9/2019</a:t>
             </a:fld>
             <a:endParaRPr lang="en-US" dirty="0"/>
           </a:p>
@@ -2965,7 +2954,7 @@
           <a:p>
             <a:fld id="{96DFF08F-DC6B-4601-B491-B0F83F6DD2DA}" type="datetimeFigureOut">
               <a:rPr lang="en-US" dirty="0"/>
-              <a:t>4/8/2019</a:t>
+              <a:t>4/9/2019</a:t>
             </a:fld>
             <a:endParaRPr lang="en-US" dirty="0"/>
           </a:p>
@@ -3248,7 +3237,7 @@
             <a:fld id="{96DFF08F-DC6B-4601-B491-B0F83F6DD2DA}" type="datetimeFigureOut">
               <a:rPr lang="en-US" dirty="0"/>
               <a:pPr/>
-              <a:t>4/8/2019</a:t>
+              <a:t>4/9/2019</a:t>
             </a:fld>
             <a:endParaRPr lang="en-US" dirty="0"/>
           </a:p>
@@ -3978,13 +3967,32 @@
       </p:grpSpPr>
       <p:sp>
         <p:nvSpPr>
-          <p:cNvPr id="5" name="Content Placeholder 4">
-            <a:extLst>
-              <a:ext uri="{FF2B5EF4-FFF2-40B4-BE49-F238E27FC236}">
-                <a16:creationId xmlns:a16="http://schemas.microsoft.com/office/drawing/2014/main" id="{4197CF90-E072-4B70-BC8E-49A95DA02E17}"/>
-              </a:ext>
-            </a:extLst>
-          </p:cNvPr>
+          <p:cNvPr id="2" name="Title 1"/>
+          <p:cNvSpPr>
+            <a:spLocks noGrp="1"/>
+          </p:cNvSpPr>
+          <p:nvPr>
+            <p:ph type="title"/>
+          </p:nvPr>
+        </p:nvSpPr>
+        <p:spPr/>
+        <p:txBody>
+          <a:bodyPr>
+            <a:noAutofit/>
+          </a:bodyPr>
+          <a:lstStyle/>
+          <a:p>
+            <a:r>
+              <a:rPr lang="en-US" sz="4400" dirty="0"/>
+              <a:t>Mind-Sets for Successful Adoption of TDD</a:t>
+            </a:r>
+            <a:endParaRPr lang="en-US" sz="7200" b="1" dirty="0"/>
+          </a:p>
+        </p:txBody>
+      </p:sp>
+      <p:sp>
+        <p:nvSpPr>
+          <p:cNvPr id="3" name="Content Placeholder 2"/>
           <p:cNvSpPr>
             <a:spLocks noGrp="1"/>
           </p:cNvSpPr>
@@ -3994,72 +4002,51 @@
         </p:nvSpPr>
         <p:spPr/>
         <p:txBody>
-          <a:bodyPr/>
-          <a:lstStyle/>
-          <a:p>
-            <a:endParaRPr lang="en-US"/>
-          </a:p>
-        </p:txBody>
-      </p:sp>
-      <p:sp>
-        <p:nvSpPr>
-          <p:cNvPr id="7" name="Title 6">
-            <a:extLst>
-              <a:ext uri="{FF2B5EF4-FFF2-40B4-BE49-F238E27FC236}">
-                <a16:creationId xmlns:a16="http://schemas.microsoft.com/office/drawing/2014/main" id="{4B2D2FC5-295A-49AA-BFCD-208A2CBD9A6C}"/>
-              </a:ext>
-            </a:extLst>
-          </p:cNvPr>
-          <p:cNvSpPr>
-            <a:spLocks noGrp="1"/>
-          </p:cNvSpPr>
-          <p:nvPr>
-            <p:ph type="title"/>
-          </p:nvPr>
-        </p:nvSpPr>
-        <p:spPr/>
-        <p:txBody>
-          <a:bodyPr/>
-          <a:lstStyle/>
-          <a:p>
-            <a:endParaRPr lang="en-US"/>
-          </a:p>
-        </p:txBody>
-      </p:sp>
-      <p:pic>
-        <p:nvPicPr>
-          <p:cNvPr id="8" name="Picture 7">
-            <a:extLst>
-              <a:ext uri="{FF2B5EF4-FFF2-40B4-BE49-F238E27FC236}">
-                <a16:creationId xmlns:a16="http://schemas.microsoft.com/office/drawing/2014/main" id="{5EDF9272-E939-4413-8E53-4E720B13B548}"/>
-              </a:ext>
-            </a:extLst>
-          </p:cNvPr>
-          <p:cNvPicPr>
-            <a:picLocks noChangeAspect="1"/>
-          </p:cNvPicPr>
-          <p:nvPr/>
-        </p:nvPicPr>
-        <p:blipFill>
-          <a:blip r:embed="rId2"/>
-          <a:stretch>
-            <a:fillRect/>
-          </a:stretch>
-        </p:blipFill>
-        <p:spPr>
-          <a:xfrm>
-            <a:off x="1097280" y="286603"/>
-            <a:ext cx="10058400" cy="5622708"/>
-          </a:xfrm>
-          <a:prstGeom prst="rect">
-            <a:avLst/>
-          </a:prstGeom>
-        </p:spPr>
-      </p:pic>
+          <a:bodyPr>
+            <a:normAutofit/>
+          </a:bodyPr>
+          <a:lstStyle/>
+          <a:p>
+            <a:pPr lvl="1"/>
+            <a:r>
+              <a:rPr lang="en-US" sz="2800" dirty="0"/>
+              <a:t>Incrementalism</a:t>
+            </a:r>
+          </a:p>
+          <a:p>
+            <a:pPr lvl="1"/>
+            <a:r>
+              <a:rPr lang="en-US" sz="2800" dirty="0"/>
+              <a:t>Test Behavior, Not Methods</a:t>
+            </a:r>
+          </a:p>
+          <a:p>
+            <a:pPr lvl="1"/>
+            <a:r>
+              <a:rPr lang="en-US" sz="2800" dirty="0"/>
+              <a:t>Using Tests to Describe Behavior</a:t>
+            </a:r>
+          </a:p>
+          <a:p>
+            <a:pPr lvl="1"/>
+            <a:r>
+              <a:rPr lang="en-US" sz="2800" dirty="0"/>
+              <a:t>Keeping It Simple</a:t>
+            </a:r>
+          </a:p>
+          <a:p>
+            <a:pPr lvl="1"/>
+            <a:r>
+              <a:rPr lang="en-US" sz="2800" dirty="0"/>
+              <a:t>Sticking to the Cycle</a:t>
+            </a:r>
+          </a:p>
+        </p:txBody>
+      </p:sp>
     </p:spTree>
     <p:extLst>
       <p:ext uri="{BB962C8B-B14F-4D97-AF65-F5344CB8AC3E}">
-        <p14:creationId xmlns:p14="http://schemas.microsoft.com/office/powerpoint/2010/main" val="1065347247"/>
+        <p14:creationId xmlns:p14="http://schemas.microsoft.com/office/powerpoint/2010/main" val="3423839618"/>
       </p:ext>
     </p:extLst>
   </p:cSld>
@@ -4086,457 +4073,82 @@
           <a:chExt cx="0" cy="0"/>
         </a:xfrm>
       </p:grpSpPr>
-      <p:pic>
-        <p:nvPicPr>
-          <p:cNvPr id="2" name="Picture 1">
-            <a:extLst>
-              <a:ext uri="{FF2B5EF4-FFF2-40B4-BE49-F238E27FC236}">
-                <a16:creationId xmlns:a16="http://schemas.microsoft.com/office/drawing/2014/main" id="{311D9DF2-32BD-4004-8083-21A344E37B4F}"/>
-              </a:ext>
-            </a:extLst>
-          </p:cNvPr>
-          <p:cNvPicPr>
-            <a:picLocks noChangeAspect="1"/>
-          </p:cNvPicPr>
-          <p:nvPr/>
-        </p:nvPicPr>
-        <p:blipFill>
-          <a:blip r:embed="rId2"/>
-          <a:stretch>
-            <a:fillRect/>
-          </a:stretch>
-        </p:blipFill>
-        <p:spPr>
-          <a:xfrm>
-            <a:off x="1176128" y="601731"/>
-            <a:ext cx="10048463" cy="5053442"/>
-          </a:xfrm>
-          <a:prstGeom prst="rect">
-            <a:avLst/>
-          </a:prstGeom>
-        </p:spPr>
-      </p:pic>
+      <p:sp>
+        <p:nvSpPr>
+          <p:cNvPr id="2" name="Title 1"/>
+          <p:cNvSpPr>
+            <a:spLocks noGrp="1"/>
+          </p:cNvSpPr>
+          <p:nvPr>
+            <p:ph type="title"/>
+          </p:nvPr>
+        </p:nvSpPr>
+        <p:spPr/>
+        <p:txBody>
+          <a:bodyPr>
+            <a:noAutofit/>
+          </a:bodyPr>
+          <a:lstStyle/>
+          <a:p>
+            <a:r>
+              <a:rPr lang="en-US" dirty="0"/>
+              <a:t>Mechanics for Success</a:t>
+            </a:r>
+            <a:endParaRPr lang="en-US" sz="7200" b="1" dirty="0"/>
+          </a:p>
+        </p:txBody>
+      </p:sp>
+      <p:sp>
+        <p:nvSpPr>
+          <p:cNvPr id="3" name="Content Placeholder 2"/>
+          <p:cNvSpPr>
+            <a:spLocks noGrp="1"/>
+          </p:cNvSpPr>
+          <p:nvPr>
+            <p:ph idx="1"/>
+          </p:nvPr>
+        </p:nvSpPr>
+        <p:spPr/>
+        <p:txBody>
+          <a:bodyPr>
+            <a:normAutofit/>
+          </a:bodyPr>
+          <a:lstStyle/>
+          <a:p>
+            <a:pPr lvl="1"/>
+            <a:r>
+              <a:rPr lang="en-US" sz="2800" dirty="0"/>
+              <a:t>What’s the Next Test?</a:t>
+            </a:r>
+          </a:p>
+          <a:p>
+            <a:pPr lvl="1"/>
+            <a:r>
+              <a:rPr lang="en-US" sz="2800" dirty="0"/>
+              <a:t>Ten-Minute Limit</a:t>
+            </a:r>
+          </a:p>
+          <a:p>
+            <a:pPr lvl="1"/>
+            <a:r>
+              <a:rPr lang="en-US" sz="2800" dirty="0"/>
+              <a:t>Defects</a:t>
+            </a:r>
+            <a:endParaRPr lang="en-US" sz="4000" dirty="0"/>
+          </a:p>
+          <a:p>
+            <a:pPr lvl="1"/>
+            <a:r>
+              <a:rPr lang="en-US" sz="2800" dirty="0"/>
+              <a:t>Disabling Tests</a:t>
+            </a:r>
+          </a:p>
+        </p:txBody>
+      </p:sp>
     </p:spTree>
     <p:extLst>
       <p:ext uri="{BB962C8B-B14F-4D97-AF65-F5344CB8AC3E}">
-        <p14:creationId xmlns:p14="http://schemas.microsoft.com/office/powerpoint/2010/main" val="2454935025"/>
-      </p:ext>
-    </p:extLst>
-  </p:cSld>
-  <p:clrMapOvr>
-    <a:masterClrMapping/>
-  </p:clrMapOvr>
-</p:sld>
-</file>
-
-<file path=ppt/slides/slide13.xml><?xml version="1.0" encoding="utf-8"?>
-<p:sld xmlns:a="http://schemas.openxmlformats.org/drawingml/2006/main" xmlns:r="http://schemas.openxmlformats.org/officeDocument/2006/relationships" xmlns:p="http://schemas.openxmlformats.org/presentationml/2006/main">
-  <p:cSld>
-    <p:spTree>
-      <p:nvGrpSpPr>
-        <p:cNvPr id="1" name=""/>
-        <p:cNvGrpSpPr/>
-        <p:nvPr/>
-      </p:nvGrpSpPr>
-      <p:grpSpPr>
-        <a:xfrm>
-          <a:off x="0" y="0"/>
-          <a:ext cx="0" cy="0"/>
-          <a:chOff x="0" y="0"/>
-          <a:chExt cx="0" cy="0"/>
-        </a:xfrm>
-      </p:grpSpPr>
-      <p:pic>
-        <p:nvPicPr>
-          <p:cNvPr id="3" name="Picture 2">
-            <a:extLst>
-              <a:ext uri="{FF2B5EF4-FFF2-40B4-BE49-F238E27FC236}">
-                <a16:creationId xmlns:a16="http://schemas.microsoft.com/office/drawing/2014/main" id="{9363930C-2CFB-4104-9251-18BB15D03265}"/>
-              </a:ext>
-            </a:extLst>
-          </p:cNvPr>
-          <p:cNvPicPr>
-            <a:picLocks noChangeAspect="1"/>
-          </p:cNvPicPr>
-          <p:nvPr/>
-        </p:nvPicPr>
-        <p:blipFill rotWithShape="1">
-          <a:blip r:embed="rId2"/>
-          <a:srcRect l="5245" r="9317"/>
-          <a:stretch/>
-        </p:blipFill>
-        <p:spPr>
-          <a:xfrm>
-            <a:off x="198783" y="857042"/>
-            <a:ext cx="11224591" cy="2376487"/>
-          </a:xfrm>
-          <a:prstGeom prst="rect">
-            <a:avLst/>
-          </a:prstGeom>
-        </p:spPr>
-      </p:pic>
-    </p:spTree>
-    <p:extLst>
-      <p:ext uri="{BB962C8B-B14F-4D97-AF65-F5344CB8AC3E}">
-        <p14:creationId xmlns:p14="http://schemas.microsoft.com/office/powerpoint/2010/main" val="3738485084"/>
-      </p:ext>
-    </p:extLst>
-  </p:cSld>
-  <p:clrMapOvr>
-    <a:masterClrMapping/>
-  </p:clrMapOvr>
-</p:sld>
-</file>
-
-<file path=ppt/slides/slide14.xml><?xml version="1.0" encoding="utf-8"?>
-<p:sld xmlns:a="http://schemas.openxmlformats.org/drawingml/2006/main" xmlns:r="http://schemas.openxmlformats.org/officeDocument/2006/relationships" xmlns:p="http://schemas.openxmlformats.org/presentationml/2006/main">
-  <p:cSld>
-    <p:spTree>
-      <p:nvGrpSpPr>
-        <p:cNvPr id="1" name=""/>
-        <p:cNvGrpSpPr/>
-        <p:nvPr/>
-      </p:nvGrpSpPr>
-      <p:grpSpPr>
-        <a:xfrm>
-          <a:off x="0" y="0"/>
-          <a:ext cx="0" cy="0"/>
-          <a:chOff x="0" y="0"/>
-          <a:chExt cx="0" cy="0"/>
-        </a:xfrm>
-      </p:grpSpPr>
-      <p:pic>
-        <p:nvPicPr>
-          <p:cNvPr id="2" name="Picture 1">
-            <a:extLst>
-              <a:ext uri="{FF2B5EF4-FFF2-40B4-BE49-F238E27FC236}">
-                <a16:creationId xmlns:a16="http://schemas.microsoft.com/office/drawing/2014/main" id="{21567A5E-FBDD-450A-AB85-AC88DACA0F22}"/>
-              </a:ext>
-            </a:extLst>
-          </p:cNvPr>
-          <p:cNvPicPr>
-            <a:picLocks noChangeAspect="1"/>
-          </p:cNvPicPr>
-          <p:nvPr/>
-        </p:nvPicPr>
-        <p:blipFill rotWithShape="1">
-          <a:blip r:embed="rId2"/>
-          <a:srcRect t="1812"/>
-          <a:stretch/>
-        </p:blipFill>
-        <p:spPr>
-          <a:xfrm>
-            <a:off x="939661" y="318052"/>
-            <a:ext cx="10312677" cy="5969366"/>
-          </a:xfrm>
-          <a:prstGeom prst="rect">
-            <a:avLst/>
-          </a:prstGeom>
-        </p:spPr>
-      </p:pic>
-    </p:spTree>
-    <p:extLst>
-      <p:ext uri="{BB962C8B-B14F-4D97-AF65-F5344CB8AC3E}">
-        <p14:creationId xmlns:p14="http://schemas.microsoft.com/office/powerpoint/2010/main" val="36779969"/>
-      </p:ext>
-    </p:extLst>
-  </p:cSld>
-  <p:clrMapOvr>
-    <a:masterClrMapping/>
-  </p:clrMapOvr>
-</p:sld>
-</file>
-
-<file path=ppt/slides/slide15.xml><?xml version="1.0" encoding="utf-8"?>
-<p:sld xmlns:a="http://schemas.openxmlformats.org/drawingml/2006/main" xmlns:r="http://schemas.openxmlformats.org/officeDocument/2006/relationships" xmlns:p="http://schemas.openxmlformats.org/presentationml/2006/main">
-  <p:cSld>
-    <p:spTree>
-      <p:nvGrpSpPr>
-        <p:cNvPr id="1" name=""/>
-        <p:cNvGrpSpPr/>
-        <p:nvPr/>
-      </p:nvGrpSpPr>
-      <p:grpSpPr>
-        <a:xfrm>
-          <a:off x="0" y="0"/>
-          <a:ext cx="0" cy="0"/>
-          <a:chOff x="0" y="0"/>
-          <a:chExt cx="0" cy="0"/>
-        </a:xfrm>
-      </p:grpSpPr>
-      <p:pic>
-        <p:nvPicPr>
-          <p:cNvPr id="3" name="Picture 2">
-            <a:extLst>
-              <a:ext uri="{FF2B5EF4-FFF2-40B4-BE49-F238E27FC236}">
-                <a16:creationId xmlns:a16="http://schemas.microsoft.com/office/drawing/2014/main" id="{224190EC-0556-4A8D-9F22-8BE43CF7C349}"/>
-              </a:ext>
-            </a:extLst>
-          </p:cNvPr>
-          <p:cNvPicPr>
-            <a:picLocks noChangeAspect="1"/>
-          </p:cNvPicPr>
-          <p:nvPr/>
-        </p:nvPicPr>
-        <p:blipFill>
-          <a:blip r:embed="rId2"/>
-          <a:stretch>
-            <a:fillRect/>
-          </a:stretch>
-        </p:blipFill>
-        <p:spPr>
-          <a:xfrm>
-            <a:off x="431523" y="1240320"/>
-            <a:ext cx="11429080" cy="1701663"/>
-          </a:xfrm>
-          <a:prstGeom prst="rect">
-            <a:avLst/>
-          </a:prstGeom>
-        </p:spPr>
-      </p:pic>
-    </p:spTree>
-    <p:extLst>
-      <p:ext uri="{BB962C8B-B14F-4D97-AF65-F5344CB8AC3E}">
-        <p14:creationId xmlns:p14="http://schemas.microsoft.com/office/powerpoint/2010/main" val="928197704"/>
-      </p:ext>
-    </p:extLst>
-  </p:cSld>
-  <p:clrMapOvr>
-    <a:masterClrMapping/>
-  </p:clrMapOvr>
-</p:sld>
-</file>
-
-<file path=ppt/slides/slide16.xml><?xml version="1.0" encoding="utf-8"?>
-<p:sld xmlns:a="http://schemas.openxmlformats.org/drawingml/2006/main" xmlns:r="http://schemas.openxmlformats.org/officeDocument/2006/relationships" xmlns:p="http://schemas.openxmlformats.org/presentationml/2006/main">
-  <p:cSld>
-    <p:spTree>
-      <p:nvGrpSpPr>
-        <p:cNvPr id="1" name=""/>
-        <p:cNvGrpSpPr/>
-        <p:nvPr/>
-      </p:nvGrpSpPr>
-      <p:grpSpPr>
-        <a:xfrm>
-          <a:off x="0" y="0"/>
-          <a:ext cx="0" cy="0"/>
-          <a:chOff x="0" y="0"/>
-          <a:chExt cx="0" cy="0"/>
-        </a:xfrm>
-      </p:grpSpPr>
-      <p:pic>
-        <p:nvPicPr>
-          <p:cNvPr id="2" name="Picture 1">
-            <a:extLst>
-              <a:ext uri="{FF2B5EF4-FFF2-40B4-BE49-F238E27FC236}">
-                <a16:creationId xmlns:a16="http://schemas.microsoft.com/office/drawing/2014/main" id="{9B39B092-EF26-46A7-BA1D-A02256211DF8}"/>
-              </a:ext>
-            </a:extLst>
-          </p:cNvPr>
-          <p:cNvPicPr>
-            <a:picLocks noChangeAspect="1"/>
-          </p:cNvPicPr>
-          <p:nvPr/>
-        </p:nvPicPr>
-        <p:blipFill>
-          <a:blip r:embed="rId2"/>
-          <a:stretch>
-            <a:fillRect/>
-          </a:stretch>
-        </p:blipFill>
-        <p:spPr>
-          <a:xfrm>
-            <a:off x="821427" y="379313"/>
-            <a:ext cx="10549145" cy="5807826"/>
-          </a:xfrm>
-          <a:prstGeom prst="rect">
-            <a:avLst/>
-          </a:prstGeom>
-        </p:spPr>
-      </p:pic>
-    </p:spTree>
-    <p:extLst>
-      <p:ext uri="{BB962C8B-B14F-4D97-AF65-F5344CB8AC3E}">
-        <p14:creationId xmlns:p14="http://schemas.microsoft.com/office/powerpoint/2010/main" val="846038417"/>
-      </p:ext>
-    </p:extLst>
-  </p:cSld>
-  <p:clrMapOvr>
-    <a:masterClrMapping/>
-  </p:clrMapOvr>
-</p:sld>
-</file>
-
-<file path=ppt/slides/slide17.xml><?xml version="1.0" encoding="utf-8"?>
-<p:sld xmlns:a="http://schemas.openxmlformats.org/drawingml/2006/main" xmlns:r="http://schemas.openxmlformats.org/officeDocument/2006/relationships" xmlns:p="http://schemas.openxmlformats.org/presentationml/2006/main">
-  <p:cSld>
-    <p:spTree>
-      <p:nvGrpSpPr>
-        <p:cNvPr id="1" name=""/>
-        <p:cNvGrpSpPr/>
-        <p:nvPr/>
-      </p:nvGrpSpPr>
-      <p:grpSpPr>
-        <a:xfrm>
-          <a:off x="0" y="0"/>
-          <a:ext cx="0" cy="0"/>
-          <a:chOff x="0" y="0"/>
-          <a:chExt cx="0" cy="0"/>
-        </a:xfrm>
-      </p:grpSpPr>
-      <p:pic>
-        <p:nvPicPr>
-          <p:cNvPr id="3" name="Picture 2">
-            <a:extLst>
-              <a:ext uri="{FF2B5EF4-FFF2-40B4-BE49-F238E27FC236}">
-                <a16:creationId xmlns:a16="http://schemas.microsoft.com/office/drawing/2014/main" id="{132EAA2E-6EB6-4A9B-BE0B-D76F06BF1A0C}"/>
-              </a:ext>
-            </a:extLst>
-          </p:cNvPr>
-          <p:cNvPicPr>
-            <a:picLocks noChangeAspect="1"/>
-          </p:cNvPicPr>
-          <p:nvPr/>
-        </p:nvPicPr>
-        <p:blipFill>
-          <a:blip r:embed="rId2"/>
-          <a:stretch>
-            <a:fillRect/>
-          </a:stretch>
-        </p:blipFill>
-        <p:spPr>
-          <a:xfrm>
-            <a:off x="265871" y="1217128"/>
-            <a:ext cx="12302279" cy="1062245"/>
-          </a:xfrm>
-          <a:prstGeom prst="rect">
-            <a:avLst/>
-          </a:prstGeom>
-        </p:spPr>
-      </p:pic>
-    </p:spTree>
-    <p:extLst>
-      <p:ext uri="{BB962C8B-B14F-4D97-AF65-F5344CB8AC3E}">
-        <p14:creationId xmlns:p14="http://schemas.microsoft.com/office/powerpoint/2010/main" val="3738326320"/>
-      </p:ext>
-    </p:extLst>
-  </p:cSld>
-  <p:clrMapOvr>
-    <a:masterClrMapping/>
-  </p:clrMapOvr>
-</p:sld>
-</file>
-
-<file path=ppt/slides/slide18.xml><?xml version="1.0" encoding="utf-8"?>
-<p:sld xmlns:a="http://schemas.openxmlformats.org/drawingml/2006/main" xmlns:r="http://schemas.openxmlformats.org/officeDocument/2006/relationships" xmlns:p="http://schemas.openxmlformats.org/presentationml/2006/main">
-  <p:cSld>
-    <p:spTree>
-      <p:nvGrpSpPr>
-        <p:cNvPr id="1" name=""/>
-        <p:cNvGrpSpPr/>
-        <p:nvPr/>
-      </p:nvGrpSpPr>
-      <p:grpSpPr>
-        <a:xfrm>
-          <a:off x="0" y="0"/>
-          <a:ext cx="0" cy="0"/>
-          <a:chOff x="0" y="0"/>
-          <a:chExt cx="0" cy="0"/>
-        </a:xfrm>
-      </p:grpSpPr>
-      <p:pic>
-        <p:nvPicPr>
-          <p:cNvPr id="2" name="Picture 1">
-            <a:extLst>
-              <a:ext uri="{FF2B5EF4-FFF2-40B4-BE49-F238E27FC236}">
-                <a16:creationId xmlns:a16="http://schemas.microsoft.com/office/drawing/2014/main" id="{D2D5169B-5A89-4A43-B3BC-775BD100A8E6}"/>
-              </a:ext>
-            </a:extLst>
-          </p:cNvPr>
-          <p:cNvPicPr>
-            <a:picLocks noChangeAspect="1"/>
-          </p:cNvPicPr>
-          <p:nvPr/>
-        </p:nvPicPr>
-        <p:blipFill>
-          <a:blip r:embed="rId2"/>
-          <a:stretch>
-            <a:fillRect/>
-          </a:stretch>
-        </p:blipFill>
-        <p:spPr>
-          <a:xfrm>
-            <a:off x="0" y="1020832"/>
-            <a:ext cx="12159093" cy="2235890"/>
-          </a:xfrm>
-          <a:prstGeom prst="rect">
-            <a:avLst/>
-          </a:prstGeom>
-        </p:spPr>
-      </p:pic>
-    </p:spTree>
-    <p:extLst>
-      <p:ext uri="{BB962C8B-B14F-4D97-AF65-F5344CB8AC3E}">
-        <p14:creationId xmlns:p14="http://schemas.microsoft.com/office/powerpoint/2010/main" val="2278643597"/>
-      </p:ext>
-    </p:extLst>
-  </p:cSld>
-  <p:clrMapOvr>
-    <a:masterClrMapping/>
-  </p:clrMapOvr>
-</p:sld>
-</file>
-
-<file path=ppt/slides/slide19.xml><?xml version="1.0" encoding="utf-8"?>
-<p:sld xmlns:a="http://schemas.openxmlformats.org/drawingml/2006/main" xmlns:r="http://schemas.openxmlformats.org/officeDocument/2006/relationships" xmlns:p="http://schemas.openxmlformats.org/presentationml/2006/main">
-  <p:cSld>
-    <p:spTree>
-      <p:nvGrpSpPr>
-        <p:cNvPr id="1" name=""/>
-        <p:cNvGrpSpPr/>
-        <p:nvPr/>
-      </p:nvGrpSpPr>
-      <p:grpSpPr>
-        <a:xfrm>
-          <a:off x="0" y="0"/>
-          <a:ext cx="0" cy="0"/>
-          <a:chOff x="0" y="0"/>
-          <a:chExt cx="0" cy="0"/>
-        </a:xfrm>
-      </p:grpSpPr>
-      <p:pic>
-        <p:nvPicPr>
-          <p:cNvPr id="3" name="Picture 2">
-            <a:extLst>
-              <a:ext uri="{FF2B5EF4-FFF2-40B4-BE49-F238E27FC236}">
-                <a16:creationId xmlns:a16="http://schemas.microsoft.com/office/drawing/2014/main" id="{7701AC52-E8C9-44CA-9D61-7B6551CEAD5E}"/>
-              </a:ext>
-            </a:extLst>
-          </p:cNvPr>
-          <p:cNvPicPr>
-            <a:picLocks noChangeAspect="1"/>
-          </p:cNvPicPr>
-          <p:nvPr/>
-        </p:nvPicPr>
-        <p:blipFill rotWithShape="1">
-          <a:blip r:embed="rId2"/>
-          <a:srcRect t="2315"/>
-          <a:stretch/>
-        </p:blipFill>
-        <p:spPr>
-          <a:xfrm>
-            <a:off x="0" y="1245703"/>
-            <a:ext cx="11881444" cy="3233531"/>
-          </a:xfrm>
-          <a:prstGeom prst="rect">
-            <a:avLst/>
-          </a:prstGeom>
-        </p:spPr>
-      </p:pic>
-    </p:spTree>
-    <p:extLst>
-      <p:ext uri="{BB962C8B-B14F-4D97-AF65-F5344CB8AC3E}">
-        <p14:creationId xmlns:p14="http://schemas.microsoft.com/office/powerpoint/2010/main" val="2832764046"/>
+        <p14:creationId xmlns:p14="http://schemas.microsoft.com/office/powerpoint/2010/main" val="1095017781"/>
       </p:ext>
     </p:extLst>
   </p:cSld>
@@ -4681,335 +4293,6 @@
 </p:sld>
 </file>
 
-<file path=ppt/slides/slide20.xml><?xml version="1.0" encoding="utf-8"?>
-<p:sld xmlns:a="http://schemas.openxmlformats.org/drawingml/2006/main" xmlns:r="http://schemas.openxmlformats.org/officeDocument/2006/relationships" xmlns:p="http://schemas.openxmlformats.org/presentationml/2006/main">
-  <p:cSld>
-    <p:spTree>
-      <p:nvGrpSpPr>
-        <p:cNvPr id="1" name=""/>
-        <p:cNvGrpSpPr/>
-        <p:nvPr/>
-      </p:nvGrpSpPr>
-      <p:grpSpPr>
-        <a:xfrm>
-          <a:off x="0" y="0"/>
-          <a:ext cx="0" cy="0"/>
-          <a:chOff x="0" y="0"/>
-          <a:chExt cx="0" cy="0"/>
-        </a:xfrm>
-      </p:grpSpPr>
-      <p:pic>
-        <p:nvPicPr>
-          <p:cNvPr id="2" name="Picture 1">
-            <a:extLst>
-              <a:ext uri="{FF2B5EF4-FFF2-40B4-BE49-F238E27FC236}">
-                <a16:creationId xmlns:a16="http://schemas.microsoft.com/office/drawing/2014/main" id="{86C979FA-E983-4494-B897-F4DF8E756A5E}"/>
-              </a:ext>
-            </a:extLst>
-          </p:cNvPr>
-          <p:cNvPicPr>
-            <a:picLocks noChangeAspect="1"/>
-          </p:cNvPicPr>
-          <p:nvPr/>
-        </p:nvPicPr>
-        <p:blipFill rotWithShape="1">
-          <a:blip r:embed="rId2"/>
-          <a:srcRect t="3260"/>
-          <a:stretch/>
-        </p:blipFill>
-        <p:spPr>
-          <a:xfrm>
-            <a:off x="-109454" y="1166191"/>
-            <a:ext cx="12340127" cy="3538330"/>
-          </a:xfrm>
-          <a:prstGeom prst="rect">
-            <a:avLst/>
-          </a:prstGeom>
-        </p:spPr>
-      </p:pic>
-    </p:spTree>
-    <p:extLst>
-      <p:ext uri="{BB962C8B-B14F-4D97-AF65-F5344CB8AC3E}">
-        <p14:creationId xmlns:p14="http://schemas.microsoft.com/office/powerpoint/2010/main" val="3309813950"/>
-      </p:ext>
-    </p:extLst>
-  </p:cSld>
-  <p:clrMapOvr>
-    <a:masterClrMapping/>
-  </p:clrMapOvr>
-</p:sld>
-</file>
-
-<file path=ppt/slides/slide21.xml><?xml version="1.0" encoding="utf-8"?>
-<p:sld xmlns:a="http://schemas.openxmlformats.org/drawingml/2006/main" xmlns:r="http://schemas.openxmlformats.org/officeDocument/2006/relationships" xmlns:p="http://schemas.openxmlformats.org/presentationml/2006/main">
-  <p:cSld>
-    <p:spTree>
-      <p:nvGrpSpPr>
-        <p:cNvPr id="1" name=""/>
-        <p:cNvGrpSpPr/>
-        <p:nvPr/>
-      </p:nvGrpSpPr>
-      <p:grpSpPr>
-        <a:xfrm>
-          <a:off x="0" y="0"/>
-          <a:ext cx="0" cy="0"/>
-          <a:chOff x="0" y="0"/>
-          <a:chExt cx="0" cy="0"/>
-        </a:xfrm>
-      </p:grpSpPr>
-      <p:pic>
-        <p:nvPicPr>
-          <p:cNvPr id="3" name="Picture 2">
-            <a:extLst>
-              <a:ext uri="{FF2B5EF4-FFF2-40B4-BE49-F238E27FC236}">
-                <a16:creationId xmlns:a16="http://schemas.microsoft.com/office/drawing/2014/main" id="{152D46F9-5FED-4858-ACC8-F9F7B6ED2ED9}"/>
-              </a:ext>
-            </a:extLst>
-          </p:cNvPr>
-          <p:cNvPicPr>
-            <a:picLocks noChangeAspect="1"/>
-          </p:cNvPicPr>
-          <p:nvPr/>
-        </p:nvPicPr>
-        <p:blipFill>
-          <a:blip r:embed="rId2"/>
-          <a:stretch>
-            <a:fillRect/>
-          </a:stretch>
-        </p:blipFill>
-        <p:spPr>
-          <a:xfrm>
-            <a:off x="0" y="815422"/>
-            <a:ext cx="12163954" cy="3266247"/>
-          </a:xfrm>
-          <a:prstGeom prst="rect">
-            <a:avLst/>
-          </a:prstGeom>
-        </p:spPr>
-      </p:pic>
-    </p:spTree>
-    <p:extLst>
-      <p:ext uri="{BB962C8B-B14F-4D97-AF65-F5344CB8AC3E}">
-        <p14:creationId xmlns:p14="http://schemas.microsoft.com/office/powerpoint/2010/main" val="239425696"/>
-      </p:ext>
-    </p:extLst>
-  </p:cSld>
-  <p:clrMapOvr>
-    <a:masterClrMapping/>
-  </p:clrMapOvr>
-</p:sld>
-</file>
-
-<file path=ppt/slides/slide22.xml><?xml version="1.0" encoding="utf-8"?>
-<p:sld xmlns:a="http://schemas.openxmlformats.org/drawingml/2006/main" xmlns:r="http://schemas.openxmlformats.org/officeDocument/2006/relationships" xmlns:p="http://schemas.openxmlformats.org/presentationml/2006/main">
-  <p:cSld>
-    <p:spTree>
-      <p:nvGrpSpPr>
-        <p:cNvPr id="1" name=""/>
-        <p:cNvGrpSpPr/>
-        <p:nvPr/>
-      </p:nvGrpSpPr>
-      <p:grpSpPr>
-        <a:xfrm>
-          <a:off x="0" y="0"/>
-          <a:ext cx="0" cy="0"/>
-          <a:chOff x="0" y="0"/>
-          <a:chExt cx="0" cy="0"/>
-        </a:xfrm>
-      </p:grpSpPr>
-      <p:sp>
-        <p:nvSpPr>
-          <p:cNvPr id="2" name="Title 1"/>
-          <p:cNvSpPr>
-            <a:spLocks noGrp="1"/>
-          </p:cNvSpPr>
-          <p:nvPr>
-            <p:ph type="title"/>
-          </p:nvPr>
-        </p:nvSpPr>
-        <p:spPr/>
-        <p:txBody>
-          <a:bodyPr>
-            <a:noAutofit/>
-          </a:bodyPr>
-          <a:lstStyle/>
-          <a:p>
-            <a:r>
-              <a:rPr lang="en-US" sz="4400" dirty="0"/>
-              <a:t>Mind-Sets for Successful Adoption of TDD</a:t>
-            </a:r>
-            <a:endParaRPr lang="en-US" sz="7200" b="1" dirty="0"/>
-          </a:p>
-        </p:txBody>
-      </p:sp>
-      <p:sp>
-        <p:nvSpPr>
-          <p:cNvPr id="3" name="Content Placeholder 2"/>
-          <p:cNvSpPr>
-            <a:spLocks noGrp="1"/>
-          </p:cNvSpPr>
-          <p:nvPr>
-            <p:ph idx="1"/>
-          </p:nvPr>
-        </p:nvSpPr>
-        <p:spPr/>
-        <p:txBody>
-          <a:bodyPr>
-            <a:normAutofit/>
-          </a:bodyPr>
-          <a:lstStyle/>
-          <a:p>
-            <a:pPr lvl="1"/>
-            <a:r>
-              <a:rPr lang="en-US" sz="2800" dirty="0"/>
-              <a:t>Incrementalism</a:t>
-            </a:r>
-          </a:p>
-          <a:p>
-            <a:pPr lvl="1"/>
-            <a:r>
-              <a:rPr lang="en-US" sz="2800" dirty="0"/>
-              <a:t>Test Behavior, Not Methods</a:t>
-            </a:r>
-          </a:p>
-          <a:p>
-            <a:pPr lvl="1"/>
-            <a:r>
-              <a:rPr lang="en-US" sz="2800" dirty="0"/>
-              <a:t>Using Tests to Describe Behavior</a:t>
-            </a:r>
-          </a:p>
-          <a:p>
-            <a:pPr lvl="1"/>
-            <a:r>
-              <a:rPr lang="en-US" sz="2800" dirty="0"/>
-              <a:t>Keeping It Simple</a:t>
-            </a:r>
-          </a:p>
-          <a:p>
-            <a:pPr lvl="1"/>
-            <a:r>
-              <a:rPr lang="en-US" sz="2800" dirty="0"/>
-              <a:t>Sticking to the Cycle</a:t>
-            </a:r>
-          </a:p>
-        </p:txBody>
-      </p:sp>
-    </p:spTree>
-    <p:extLst>
-      <p:ext uri="{BB962C8B-B14F-4D97-AF65-F5344CB8AC3E}">
-        <p14:creationId xmlns:p14="http://schemas.microsoft.com/office/powerpoint/2010/main" val="3423839618"/>
-      </p:ext>
-    </p:extLst>
-  </p:cSld>
-  <p:clrMapOvr>
-    <a:masterClrMapping/>
-  </p:clrMapOvr>
-</p:sld>
-</file>
-
-<file path=ppt/slides/slide23.xml><?xml version="1.0" encoding="utf-8"?>
-<p:sld xmlns:a="http://schemas.openxmlformats.org/drawingml/2006/main" xmlns:r="http://schemas.openxmlformats.org/officeDocument/2006/relationships" xmlns:p="http://schemas.openxmlformats.org/presentationml/2006/main">
-  <p:cSld>
-    <p:spTree>
-      <p:nvGrpSpPr>
-        <p:cNvPr id="1" name=""/>
-        <p:cNvGrpSpPr/>
-        <p:nvPr/>
-      </p:nvGrpSpPr>
-      <p:grpSpPr>
-        <a:xfrm>
-          <a:off x="0" y="0"/>
-          <a:ext cx="0" cy="0"/>
-          <a:chOff x="0" y="0"/>
-          <a:chExt cx="0" cy="0"/>
-        </a:xfrm>
-      </p:grpSpPr>
-      <p:sp>
-        <p:nvSpPr>
-          <p:cNvPr id="2" name="Title 1"/>
-          <p:cNvSpPr>
-            <a:spLocks noGrp="1"/>
-          </p:cNvSpPr>
-          <p:nvPr>
-            <p:ph type="title"/>
-          </p:nvPr>
-        </p:nvSpPr>
-        <p:spPr/>
-        <p:txBody>
-          <a:bodyPr>
-            <a:noAutofit/>
-          </a:bodyPr>
-          <a:lstStyle/>
-          <a:p>
-            <a:r>
-              <a:rPr lang="en-US" dirty="0"/>
-              <a:t>Mechanics for Success</a:t>
-            </a:r>
-            <a:endParaRPr lang="en-US" sz="7200" b="1" dirty="0"/>
-          </a:p>
-        </p:txBody>
-      </p:sp>
-      <p:sp>
-        <p:nvSpPr>
-          <p:cNvPr id="3" name="Content Placeholder 2"/>
-          <p:cNvSpPr>
-            <a:spLocks noGrp="1"/>
-          </p:cNvSpPr>
-          <p:nvPr>
-            <p:ph idx="1"/>
-          </p:nvPr>
-        </p:nvSpPr>
-        <p:spPr/>
-        <p:txBody>
-          <a:bodyPr>
-            <a:normAutofit/>
-          </a:bodyPr>
-          <a:lstStyle/>
-          <a:p>
-            <a:pPr lvl="1"/>
-            <a:r>
-              <a:rPr lang="en-US" sz="2800" dirty="0"/>
-              <a:t>What’s the Next Test?</a:t>
-            </a:r>
-          </a:p>
-          <a:p>
-            <a:pPr lvl="1"/>
-            <a:r>
-              <a:rPr lang="en-US" sz="2800" dirty="0"/>
-              <a:t>Ten-Minute Limit</a:t>
-            </a:r>
-          </a:p>
-          <a:p>
-            <a:pPr lvl="1"/>
-            <a:r>
-              <a:rPr lang="en-US" sz="2800" dirty="0"/>
-              <a:t>Defects</a:t>
-            </a:r>
-            <a:endParaRPr lang="en-US" sz="4000" dirty="0"/>
-          </a:p>
-          <a:p>
-            <a:pPr lvl="1"/>
-            <a:r>
-              <a:rPr lang="en-US" sz="2800" dirty="0"/>
-              <a:t>Disabling Tests</a:t>
-            </a:r>
-          </a:p>
-        </p:txBody>
-      </p:sp>
-    </p:spTree>
-    <p:extLst>
-      <p:ext uri="{BB962C8B-B14F-4D97-AF65-F5344CB8AC3E}">
-        <p14:creationId xmlns:p14="http://schemas.microsoft.com/office/powerpoint/2010/main" val="1095017781"/>
-      </p:ext>
-    </p:extLst>
-  </p:cSld>
-  <p:clrMapOvr>
-    <a:masterClrMapping/>
-  </p:clrMapOvr>
-</p:sld>
-</file>
-
 <file path=ppt/slides/slide3.xml><?xml version="1.0" encoding="utf-8"?>
 <p:sld xmlns:a="http://schemas.openxmlformats.org/drawingml/2006/main" xmlns:r="http://schemas.openxmlformats.org/officeDocument/2006/relationships" xmlns:p="http://schemas.openxmlformats.org/presentationml/2006/main">
   <p:cSld>
@@ -5068,11 +4351,11 @@
           <a:p>
             <a:r>
               <a:rPr lang="en-US" dirty="0"/>
-              <a:t>A single unit test consists of a descriptive name and a series of code state-</a:t>
-            </a:r>
-            <a:r>
-              <a:rPr lang="en-US" dirty="0" err="1"/>
-              <a:t>ments</a:t>
+              <a:t>A single unit test consists of a descriptive name and a series of code </a:t>
+            </a:r>
+            <a:r>
+              <a:rPr lang="en-US" dirty="0" smtClean="0"/>
+              <a:t>statements</a:t>
             </a:r>
             <a:r>
               <a:rPr lang="en-US" dirty="0"/>
@@ -5602,18 +4885,18 @@
           <a:p>
             <a:pPr lvl="1"/>
             <a:r>
-              <a:rPr lang="en-US" dirty="0"/>
+              <a:rPr lang="en-US" sz="2000" dirty="0"/>
               <a:t>You refactor (a term popularized by Martin </a:t>
             </a:r>
             <a:r>
-              <a:rPr lang="en-US" dirty="0" err="1"/>
+              <a:rPr lang="en-US" sz="2000" dirty="0" err="1"/>
               <a:t>Fowler’sRefactoring</a:t>
             </a:r>
             <a:r>
-              <a:rPr lang="en-US" dirty="0"/>
+              <a:rPr lang="en-US" sz="2000" dirty="0"/>
               <a:t>: Improving the Design of Existing Code) when you improve your code’s design without changing its behavior, something that having tests allows you to safely do.</a:t>
             </a:r>
-            <a:endParaRPr lang="en-US" dirty="0">
+            <a:endParaRPr lang="en-US" sz="2000" dirty="0">
               <a:solidFill>
                 <a:schemeClr val="tx1"/>
               </a:solidFill>

</xml_diff>